<commit_message>
add more pros and cons
</commit_message>
<xml_diff>
--- a/composition_over_inheritance.pptx
+++ b/composition_over_inheritance.pptx
@@ -7,7 +7,13 @@
   <p:sldIdLst>
     <p:sldId id="256" r:id="rId2"/>
     <p:sldId id="258" r:id="rId3"/>
-    <p:sldId id="257" r:id="rId4"/>
+    <p:sldId id="260" r:id="rId4"/>
+    <p:sldId id="257" r:id="rId5"/>
+    <p:sldId id="259" r:id="rId6"/>
+    <p:sldId id="264" r:id="rId7"/>
+    <p:sldId id="261" r:id="rId8"/>
+    <p:sldId id="262" r:id="rId9"/>
+    <p:sldId id="263" r:id="rId10"/>
   </p:sldIdLst>
   <p:sldSz cx="12192000" cy="6858000"/>
   <p:notesSz cx="6858000" cy="9144000"/>
@@ -3844,7 +3850,7 @@
           <a:p>
             <a:r>
               <a:rPr lang="en-DE" dirty="0"/>
-              <a:t>Barcamp von Dominik Rusz und Laura Borowski</a:t>
+              <a:t>Macht das Sinn?</a:t>
             </a:r>
           </a:p>
         </p:txBody>
@@ -3928,7 +3934,10 @@
           <a:bodyPr/>
           <a:lstStyle/>
           <a:p>
-            <a:endParaRPr lang="en-DE"/>
+            <a:r>
+              <a:rPr lang="en-DE" dirty="0"/>
+              <a:t>Historischer Hintergrund</a:t>
+            </a:r>
           </a:p>
         </p:txBody>
       </p:sp>
@@ -3964,6 +3973,115 @@
       </p:grpSpPr>
       <p:sp>
         <p:nvSpPr>
+          <p:cNvPr id="3" name="Content Placeholder 2">
+            <a:extLst>
+              <a:ext uri="{FF2B5EF4-FFF2-40B4-BE49-F238E27FC236}">
+                <a16:creationId xmlns:a16="http://schemas.microsoft.com/office/drawing/2014/main" id="{91EF6A69-0C69-6542-29F0-A7AB30C4AA7B}"/>
+              </a:ext>
+            </a:extLst>
+          </p:cNvPr>
+          <p:cNvSpPr>
+            <a:spLocks noGrp="1"/>
+          </p:cNvSpPr>
+          <p:nvPr>
+            <p:ph idx="1"/>
+          </p:nvPr>
+        </p:nvSpPr>
+        <p:spPr>
+          <a:xfrm>
+            <a:off x="1295400" y="1453662"/>
+            <a:ext cx="9601200" cy="3581400"/>
+          </a:xfrm>
+        </p:spPr>
+        <p:txBody>
+          <a:bodyPr/>
+          <a:lstStyle/>
+          <a:p>
+            <a:r>
+              <a:rPr lang="en-DE" dirty="0"/>
+              <a:t>Anfänger der OOP: Vererbung war die Norm</a:t>
+            </a:r>
+          </a:p>
+          <a:p>
+            <a:r>
+              <a:rPr lang="en-DE" dirty="0"/>
+              <a:t> Durch Objektorientiertes Denken (Klassen) war Vererbung das sinnvollste</a:t>
+            </a:r>
+          </a:p>
+          <a:p>
+            <a:r>
+              <a:rPr lang="en-DE" dirty="0"/>
+              <a:t>Mehrfachvererbung führte irgendwann zu Problemen</a:t>
+            </a:r>
+          </a:p>
+          <a:p>
+            <a:pPr lvl="1"/>
+            <a:r>
+              <a:rPr lang="en-GB" dirty="0"/>
+              <a:t>S</a:t>
+            </a:r>
+            <a:r>
+              <a:rPr lang="en-DE" dirty="0"/>
+              <a:t>chwere Wartbarkeit</a:t>
+            </a:r>
+          </a:p>
+          <a:p>
+            <a:pPr lvl="1"/>
+            <a:r>
+              <a:rPr lang="en-GB" dirty="0"/>
+              <a:t>N</a:t>
+            </a:r>
+            <a:r>
+              <a:rPr lang="en-DE" dirty="0"/>
+              <a:t>icht erweiterbar</a:t>
+            </a:r>
+          </a:p>
+          <a:p>
+            <a:r>
+              <a:rPr lang="en-DE" dirty="0"/>
+              <a:t>Buch Design Patterns prägt den Satz “Favor composition over inheritance”</a:t>
+            </a:r>
+          </a:p>
+          <a:p>
+            <a:r>
+              <a:rPr lang="en-DE" dirty="0"/>
+              <a:t>Viele Pattern nutzen seitdem Komposition (z.b. Strategy, Decorator, Dependency Injection, …)</a:t>
+            </a:r>
+          </a:p>
+        </p:txBody>
+      </p:sp>
+    </p:spTree>
+    <p:extLst>
+      <p:ext uri="{BB962C8B-B14F-4D97-AF65-F5344CB8AC3E}">
+        <p14:creationId xmlns:p14="http://schemas.microsoft.com/office/powerpoint/2010/main" val="1197533885"/>
+      </p:ext>
+    </p:extLst>
+  </p:cSld>
+  <p:clrMapOvr>
+    <a:masterClrMapping/>
+  </p:clrMapOvr>
+</p:sld>
+</file>
+
+<file path=ppt/slides/slide4.xml><?xml version="1.0" encoding="utf-8"?>
+<p:sld xmlns:a="http://schemas.openxmlformats.org/drawingml/2006/main" xmlns:r="http://schemas.openxmlformats.org/officeDocument/2006/relationships" xmlns:p="http://schemas.openxmlformats.org/presentationml/2006/main">
+  <p:cSld>
+    <p:spTree>
+      <p:nvGrpSpPr>
+        <p:cNvPr id="1" name=""/>
+        <p:cNvGrpSpPr/>
+        <p:nvPr/>
+      </p:nvGrpSpPr>
+      <p:grpSpPr>
+        <a:xfrm>
+          <a:off x="0" y="0"/>
+          <a:ext cx="0" cy="0"/>
+          <a:chOff x="0" y="0"/>
+          <a:chExt cx="0" cy="0"/>
+        </a:xfrm>
+      </p:grpSpPr>
+      <p:sp>
+        <p:nvSpPr>
           <p:cNvPr id="2" name="Title 1">
             <a:extLst>
               <a:ext uri="{FF2B5EF4-FFF2-40B4-BE49-F238E27FC236}">
@@ -4011,39 +4129,816 @@
           <a:bodyPr/>
           <a:lstStyle/>
           <a:p>
-            <a:endParaRPr lang="en-DE"/>
-          </a:p>
-        </p:txBody>
-      </p:sp>
-      <p:sp>
-        <p:nvSpPr>
-          <p:cNvPr id="4" name="Text Placeholder 3">
+            <a:r>
+              <a:rPr lang="en-GB" dirty="0"/>
+              <a:t>I</a:t>
+            </a:r>
+            <a:r>
+              <a:rPr lang="en-DE" dirty="0"/>
+              <a:t>s-a Beziehung</a:t>
+            </a:r>
+          </a:p>
+          <a:p>
+            <a:r>
+              <a:rPr lang="en-DE" dirty="0"/>
+              <a:t>Eine Subklasse übernimmt Eigenschaften und Methoden einer Basisklasse</a:t>
+            </a:r>
+          </a:p>
+          <a:p>
+            <a:r>
+              <a:rPr lang="en-DE" dirty="0"/>
+              <a:t>Wenn was geändert wird muss meistens die Basisklasse und alle Subklassen anpassen</a:t>
+            </a:r>
+          </a:p>
+          <a:p>
+            <a:endParaRPr lang="en-DE" dirty="0"/>
+          </a:p>
+          <a:p>
+            <a:r>
+              <a:rPr lang="en-DE" dirty="0"/>
+              <a:t>Beispiel: Für einen miaunden Hund müsste eine neue Subklasse ertsellt werden</a:t>
+            </a:r>
+          </a:p>
+        </p:txBody>
+      </p:sp>
+      <p:pic>
+        <p:nvPicPr>
+          <p:cNvPr id="5" name="Picture 4" descr="A computer screen with text on it&#10;&#10;AI-generated content may be incorrect.">
             <a:extLst>
               <a:ext uri="{FF2B5EF4-FFF2-40B4-BE49-F238E27FC236}">
-                <a16:creationId xmlns:a16="http://schemas.microsoft.com/office/drawing/2014/main" id="{2DEFE5C4-B2E7-31C7-C8C4-869A9A1E1222}"/>
+                <a16:creationId xmlns:a16="http://schemas.microsoft.com/office/drawing/2014/main" id="{0B908EBE-9971-F295-9C5A-F60CE8D62EDA}"/>
               </a:ext>
             </a:extLst>
           </p:cNvPr>
-          <p:cNvSpPr>
-            <a:spLocks noGrp="1"/>
-          </p:cNvSpPr>
-          <p:nvPr>
-            <p:ph type="body" sz="half" idx="2"/>
-          </p:nvPr>
-        </p:nvSpPr>
-        <p:spPr/>
-        <p:txBody>
-          <a:bodyPr/>
-          <a:lstStyle/>
-          <a:p>
-            <a:endParaRPr lang="en-DE"/>
-          </a:p>
-        </p:txBody>
-      </p:sp>
+          <p:cNvPicPr>
+            <a:picLocks noChangeAspect="1"/>
+          </p:cNvPicPr>
+          <p:nvPr/>
+        </p:nvPicPr>
+        <p:blipFill>
+          <a:blip r:embed="rId2"/>
+          <a:stretch>
+            <a:fillRect/>
+          </a:stretch>
+        </p:blipFill>
+        <p:spPr>
+          <a:xfrm>
+            <a:off x="0" y="2065082"/>
+            <a:ext cx="5229918" cy="2727836"/>
+          </a:xfrm>
+          <a:prstGeom prst="rect">
+            <a:avLst/>
+          </a:prstGeom>
+        </p:spPr>
+      </p:pic>
     </p:spTree>
     <p:extLst>
       <p:ext uri="{BB962C8B-B14F-4D97-AF65-F5344CB8AC3E}">
         <p14:creationId xmlns:p14="http://schemas.microsoft.com/office/powerpoint/2010/main" val="2439665772"/>
+      </p:ext>
+    </p:extLst>
+  </p:cSld>
+  <p:clrMapOvr>
+    <a:masterClrMapping/>
+  </p:clrMapOvr>
+</p:sld>
+</file>
+
+<file path=ppt/slides/slide5.xml><?xml version="1.0" encoding="utf-8"?>
+<p:sld xmlns:a="http://schemas.openxmlformats.org/drawingml/2006/main" xmlns:r="http://schemas.openxmlformats.org/officeDocument/2006/relationships" xmlns:p="http://schemas.openxmlformats.org/presentationml/2006/main">
+  <p:cSld>
+    <p:spTree>
+      <p:nvGrpSpPr>
+        <p:cNvPr id="1" name="">
+          <a:extLst>
+            <a:ext uri="{FF2B5EF4-FFF2-40B4-BE49-F238E27FC236}">
+              <a16:creationId xmlns:a16="http://schemas.microsoft.com/office/drawing/2014/main" id="{1E870657-1552-6D7C-1A82-C00FF43BD105}"/>
+            </a:ext>
+          </a:extLst>
+        </p:cNvPr>
+        <p:cNvGrpSpPr/>
+        <p:nvPr/>
+      </p:nvGrpSpPr>
+      <p:grpSpPr>
+        <a:xfrm>
+          <a:off x="0" y="0"/>
+          <a:ext cx="0" cy="0"/>
+          <a:chOff x="0" y="0"/>
+          <a:chExt cx="0" cy="0"/>
+        </a:xfrm>
+      </p:grpSpPr>
+      <p:sp>
+        <p:nvSpPr>
+          <p:cNvPr id="2" name="Title 1">
+            <a:extLst>
+              <a:ext uri="{FF2B5EF4-FFF2-40B4-BE49-F238E27FC236}">
+                <a16:creationId xmlns:a16="http://schemas.microsoft.com/office/drawing/2014/main" id="{D0A4296B-CBBD-AD59-90D1-A2551EF9F621}"/>
+              </a:ext>
+            </a:extLst>
+          </p:cNvPr>
+          <p:cNvSpPr>
+            <a:spLocks noGrp="1"/>
+          </p:cNvSpPr>
+          <p:nvPr>
+            <p:ph type="title"/>
+          </p:nvPr>
+        </p:nvSpPr>
+        <p:spPr/>
+        <p:txBody>
+          <a:bodyPr/>
+          <a:lstStyle/>
+          <a:p>
+            <a:r>
+              <a:rPr lang="en-DE" dirty="0"/>
+              <a:t>Komposition</a:t>
+            </a:r>
+          </a:p>
+        </p:txBody>
+      </p:sp>
+      <p:sp>
+        <p:nvSpPr>
+          <p:cNvPr id="3" name="Content Placeholder 2">
+            <a:extLst>
+              <a:ext uri="{FF2B5EF4-FFF2-40B4-BE49-F238E27FC236}">
+                <a16:creationId xmlns:a16="http://schemas.microsoft.com/office/drawing/2014/main" id="{ED5E6DC9-8136-FE39-B07F-749C4D857CF1}"/>
+              </a:ext>
+            </a:extLst>
+          </p:cNvPr>
+          <p:cNvSpPr>
+            <a:spLocks noGrp="1"/>
+          </p:cNvSpPr>
+          <p:nvPr>
+            <p:ph idx="1"/>
+          </p:nvPr>
+        </p:nvSpPr>
+        <p:spPr/>
+        <p:txBody>
+          <a:bodyPr/>
+          <a:lstStyle/>
+          <a:p>
+            <a:r>
+              <a:rPr lang="en-GB" dirty="0"/>
+              <a:t>H</a:t>
+            </a:r>
+            <a:r>
+              <a:rPr lang="en-DE" dirty="0"/>
+              <a:t>as-a Beziehung</a:t>
+            </a:r>
+          </a:p>
+          <a:p>
+            <a:r>
+              <a:rPr lang="en-DE" dirty="0"/>
+              <a:t>Eine Klasse besteht aus anderen Objekten – sie setzt Verhalten zusammen </a:t>
+            </a:r>
+          </a:p>
+          <a:p>
+            <a:r>
+              <a:rPr lang="en-DE" dirty="0"/>
+              <a:t>Klassen bekommen Komponenten für bestimmtes Verhalten</a:t>
+            </a:r>
+          </a:p>
+          <a:p>
+            <a:r>
+              <a:rPr lang="en-DE" dirty="0"/>
+              <a:t>Komponenten können kombiniert und ausgetauscht werden</a:t>
+            </a:r>
+          </a:p>
+          <a:p>
+            <a:endParaRPr lang="en-DE" dirty="0"/>
+          </a:p>
+          <a:p>
+            <a:r>
+              <a:rPr lang="en-DE" dirty="0"/>
+              <a:t>Beispiel: Animal Oberklasse könnte genutzt werden um mehrere Behavior zu kombinieren (z.B. SoundBehavior, MoveBehavior,…) und flexibel ausgetauscht werden</a:t>
+            </a:r>
+          </a:p>
+        </p:txBody>
+      </p:sp>
+      <p:pic>
+        <p:nvPicPr>
+          <p:cNvPr id="9" name="Picture 8" descr="A screen shot of a computer program&#10;&#10;AI-generated content may be incorrect.">
+            <a:extLst>
+              <a:ext uri="{FF2B5EF4-FFF2-40B4-BE49-F238E27FC236}">
+                <a16:creationId xmlns:a16="http://schemas.microsoft.com/office/drawing/2014/main" id="{A5E26124-7E88-9F4C-0C1F-44EDB7CCFA9D}"/>
+              </a:ext>
+            </a:extLst>
+          </p:cNvPr>
+          <p:cNvPicPr>
+            <a:picLocks noChangeAspect="1"/>
+          </p:cNvPicPr>
+          <p:nvPr/>
+        </p:nvPicPr>
+        <p:blipFill>
+          <a:blip r:embed="rId2"/>
+          <a:stretch>
+            <a:fillRect/>
+          </a:stretch>
+        </p:blipFill>
+        <p:spPr>
+          <a:xfrm>
+            <a:off x="45720" y="1987564"/>
+            <a:ext cx="5212079" cy="2882872"/>
+          </a:xfrm>
+          <a:prstGeom prst="rect">
+            <a:avLst/>
+          </a:prstGeom>
+        </p:spPr>
+      </p:pic>
+    </p:spTree>
+    <p:extLst>
+      <p:ext uri="{BB962C8B-B14F-4D97-AF65-F5344CB8AC3E}">
+        <p14:creationId xmlns:p14="http://schemas.microsoft.com/office/powerpoint/2010/main" val="1951272851"/>
+      </p:ext>
+    </p:extLst>
+  </p:cSld>
+  <p:clrMapOvr>
+    <a:masterClrMapping/>
+  </p:clrMapOvr>
+</p:sld>
+</file>
+
+<file path=ppt/slides/slide6.xml><?xml version="1.0" encoding="utf-8"?>
+<p:sld xmlns:a="http://schemas.openxmlformats.org/drawingml/2006/main" xmlns:r="http://schemas.openxmlformats.org/officeDocument/2006/relationships" xmlns:p="http://schemas.openxmlformats.org/presentationml/2006/main">
+  <p:cSld>
+    <p:spTree>
+      <p:nvGrpSpPr>
+        <p:cNvPr id="1" name=""/>
+        <p:cNvGrpSpPr/>
+        <p:nvPr/>
+      </p:nvGrpSpPr>
+      <p:grpSpPr>
+        <a:xfrm>
+          <a:off x="0" y="0"/>
+          <a:ext cx="0" cy="0"/>
+          <a:chOff x="0" y="0"/>
+          <a:chExt cx="0" cy="0"/>
+        </a:xfrm>
+      </p:grpSpPr>
+      <p:sp>
+        <p:nvSpPr>
+          <p:cNvPr id="2" name="Title 1">
+            <a:extLst>
+              <a:ext uri="{FF2B5EF4-FFF2-40B4-BE49-F238E27FC236}">
+                <a16:creationId xmlns:a16="http://schemas.microsoft.com/office/drawing/2014/main" id="{CF6DA34C-2EC7-5623-3A89-62FE453E88D6}"/>
+              </a:ext>
+            </a:extLst>
+          </p:cNvPr>
+          <p:cNvSpPr>
+            <a:spLocks noGrp="1"/>
+          </p:cNvSpPr>
+          <p:nvPr>
+            <p:ph type="title"/>
+          </p:nvPr>
+        </p:nvSpPr>
+        <p:spPr/>
+        <p:txBody>
+          <a:bodyPr/>
+          <a:lstStyle/>
+          <a:p>
+            <a:r>
+              <a:rPr lang="en-GB" dirty="0"/>
+              <a:t>Z</a:t>
+            </a:r>
+            <a:r>
+              <a:rPr lang="en-DE" dirty="0"/>
+              <a:t>eit für Aufgaben</a:t>
+            </a:r>
+          </a:p>
+        </p:txBody>
+      </p:sp>
+      <p:sp>
+        <p:nvSpPr>
+          <p:cNvPr id="3" name="Text Placeholder 2">
+            <a:extLst>
+              <a:ext uri="{FF2B5EF4-FFF2-40B4-BE49-F238E27FC236}">
+                <a16:creationId xmlns:a16="http://schemas.microsoft.com/office/drawing/2014/main" id="{D147DD6B-00EE-FFBA-2E14-05D52D213F7E}"/>
+              </a:ext>
+            </a:extLst>
+          </p:cNvPr>
+          <p:cNvSpPr>
+            <a:spLocks noGrp="1"/>
+          </p:cNvSpPr>
+          <p:nvPr>
+            <p:ph type="body" idx="1"/>
+          </p:nvPr>
+        </p:nvSpPr>
+        <p:spPr/>
+        <p:txBody>
+          <a:bodyPr/>
+          <a:lstStyle/>
+          <a:p>
+            <a:r>
+              <a:rPr lang="en-DE" dirty="0"/>
+              <a:t>Viel Spaß!</a:t>
+            </a:r>
+          </a:p>
+        </p:txBody>
+      </p:sp>
+    </p:spTree>
+    <p:extLst>
+      <p:ext uri="{BB962C8B-B14F-4D97-AF65-F5344CB8AC3E}">
+        <p14:creationId xmlns:p14="http://schemas.microsoft.com/office/powerpoint/2010/main" val="2728909149"/>
+      </p:ext>
+    </p:extLst>
+  </p:cSld>
+  <p:clrMapOvr>
+    <a:masterClrMapping/>
+  </p:clrMapOvr>
+</p:sld>
+</file>
+
+<file path=ppt/slides/slide7.xml><?xml version="1.0" encoding="utf-8"?>
+<p:sld xmlns:a="http://schemas.openxmlformats.org/drawingml/2006/main" xmlns:r="http://schemas.openxmlformats.org/officeDocument/2006/relationships" xmlns:p="http://schemas.openxmlformats.org/presentationml/2006/main">
+  <p:cSld>
+    <p:spTree>
+      <p:nvGrpSpPr>
+        <p:cNvPr id="1" name=""/>
+        <p:cNvGrpSpPr/>
+        <p:nvPr/>
+      </p:nvGrpSpPr>
+      <p:grpSpPr>
+        <a:xfrm>
+          <a:off x="0" y="0"/>
+          <a:ext cx="0" cy="0"/>
+          <a:chOff x="0" y="0"/>
+          <a:chExt cx="0" cy="0"/>
+        </a:xfrm>
+      </p:grpSpPr>
+      <p:sp>
+        <p:nvSpPr>
+          <p:cNvPr id="2" name="Title 1">
+            <a:extLst>
+              <a:ext uri="{FF2B5EF4-FFF2-40B4-BE49-F238E27FC236}">
+                <a16:creationId xmlns:a16="http://schemas.microsoft.com/office/drawing/2014/main" id="{0EF18354-1A67-A4A9-5FA8-3843F8422479}"/>
+              </a:ext>
+            </a:extLst>
+          </p:cNvPr>
+          <p:cNvSpPr>
+            <a:spLocks noGrp="1"/>
+          </p:cNvSpPr>
+          <p:nvPr>
+            <p:ph type="title"/>
+          </p:nvPr>
+        </p:nvSpPr>
+        <p:spPr/>
+        <p:txBody>
+          <a:bodyPr/>
+          <a:lstStyle/>
+          <a:p>
+            <a:r>
+              <a:rPr lang="en-DE" dirty="0"/>
+              <a:t>Fazit</a:t>
+            </a:r>
+          </a:p>
+        </p:txBody>
+      </p:sp>
+      <p:sp>
+        <p:nvSpPr>
+          <p:cNvPr id="3" name="Text Placeholder 2">
+            <a:extLst>
+              <a:ext uri="{FF2B5EF4-FFF2-40B4-BE49-F238E27FC236}">
+                <a16:creationId xmlns:a16="http://schemas.microsoft.com/office/drawing/2014/main" id="{83205E7F-137F-61FF-0C72-DDC41CF46163}"/>
+              </a:ext>
+            </a:extLst>
+          </p:cNvPr>
+          <p:cNvSpPr>
+            <a:spLocks noGrp="1"/>
+          </p:cNvSpPr>
+          <p:nvPr>
+            <p:ph type="body" idx="1"/>
+          </p:nvPr>
+        </p:nvSpPr>
+        <p:spPr/>
+        <p:txBody>
+          <a:bodyPr/>
+          <a:lstStyle/>
+          <a:p>
+            <a:r>
+              <a:rPr lang="en-DE" dirty="0"/>
+              <a:t>Vor – und Nachteile</a:t>
+            </a:r>
+          </a:p>
+        </p:txBody>
+      </p:sp>
+    </p:spTree>
+    <p:extLst>
+      <p:ext uri="{BB962C8B-B14F-4D97-AF65-F5344CB8AC3E}">
+        <p14:creationId xmlns:p14="http://schemas.microsoft.com/office/powerpoint/2010/main" val="422530388"/>
+      </p:ext>
+    </p:extLst>
+  </p:cSld>
+  <p:clrMapOvr>
+    <a:masterClrMapping/>
+  </p:clrMapOvr>
+</p:sld>
+</file>
+
+<file path=ppt/slides/slide8.xml><?xml version="1.0" encoding="utf-8"?>
+<p:sld xmlns:a="http://schemas.openxmlformats.org/drawingml/2006/main" xmlns:r="http://schemas.openxmlformats.org/officeDocument/2006/relationships" xmlns:p="http://schemas.openxmlformats.org/presentationml/2006/main">
+  <p:cSld>
+    <p:spTree>
+      <p:nvGrpSpPr>
+        <p:cNvPr id="1" name=""/>
+        <p:cNvGrpSpPr/>
+        <p:nvPr/>
+      </p:nvGrpSpPr>
+      <p:grpSpPr>
+        <a:xfrm>
+          <a:off x="0" y="0"/>
+          <a:ext cx="0" cy="0"/>
+          <a:chOff x="0" y="0"/>
+          <a:chExt cx="0" cy="0"/>
+        </a:xfrm>
+      </p:grpSpPr>
+      <p:sp>
+        <p:nvSpPr>
+          <p:cNvPr id="2" name="Title 1">
+            <a:extLst>
+              <a:ext uri="{FF2B5EF4-FFF2-40B4-BE49-F238E27FC236}">
+                <a16:creationId xmlns:a16="http://schemas.microsoft.com/office/drawing/2014/main" id="{9D526F6B-5EEE-2FD9-4121-201BD0289F1F}"/>
+              </a:ext>
+            </a:extLst>
+          </p:cNvPr>
+          <p:cNvSpPr>
+            <a:spLocks noGrp="1"/>
+          </p:cNvSpPr>
+          <p:nvPr>
+            <p:ph type="title"/>
+          </p:nvPr>
+        </p:nvSpPr>
+        <p:spPr/>
+        <p:txBody>
+          <a:bodyPr/>
+          <a:lstStyle/>
+          <a:p>
+            <a:r>
+              <a:rPr lang="en-DE" dirty="0"/>
+              <a:t>Vererbung</a:t>
+            </a:r>
+            <a:br>
+              <a:rPr lang="en-DE" dirty="0"/>
+            </a:br>
+            <a:r>
+              <a:rPr lang="en-DE" dirty="0"/>
+              <a:t>- </a:t>
+            </a:r>
+            <a:r>
+              <a:rPr lang="en-DE" sz="3600" dirty="0"/>
+              <a:t>der Vererbungsbaum</a:t>
+            </a:r>
+            <a:endParaRPr lang="en-DE" dirty="0"/>
+          </a:p>
+        </p:txBody>
+      </p:sp>
+      <p:sp>
+        <p:nvSpPr>
+          <p:cNvPr id="3" name="Text Placeholder 2">
+            <a:extLst>
+              <a:ext uri="{FF2B5EF4-FFF2-40B4-BE49-F238E27FC236}">
+                <a16:creationId xmlns:a16="http://schemas.microsoft.com/office/drawing/2014/main" id="{B0EBFD38-1389-65D1-C5F7-263269B71225}"/>
+              </a:ext>
+            </a:extLst>
+          </p:cNvPr>
+          <p:cNvSpPr>
+            <a:spLocks noGrp="1"/>
+          </p:cNvSpPr>
+          <p:nvPr>
+            <p:ph type="body" idx="1"/>
+          </p:nvPr>
+        </p:nvSpPr>
+        <p:spPr/>
+        <p:txBody>
+          <a:bodyPr/>
+          <a:lstStyle/>
+          <a:p>
+            <a:r>
+              <a:rPr lang="en-DE" dirty="0"/>
+              <a:t>Pros</a:t>
+            </a:r>
+          </a:p>
+        </p:txBody>
+      </p:sp>
+      <p:sp>
+        <p:nvSpPr>
+          <p:cNvPr id="4" name="Content Placeholder 3">
+            <a:extLst>
+              <a:ext uri="{FF2B5EF4-FFF2-40B4-BE49-F238E27FC236}">
+                <a16:creationId xmlns:a16="http://schemas.microsoft.com/office/drawing/2014/main" id="{3E173A2E-7D36-6AFF-EA21-0A228F3252EE}"/>
+              </a:ext>
+            </a:extLst>
+          </p:cNvPr>
+          <p:cNvSpPr>
+            <a:spLocks noGrp="1"/>
+          </p:cNvSpPr>
+          <p:nvPr>
+            <p:ph sz="half" idx="2"/>
+          </p:nvPr>
+        </p:nvSpPr>
+        <p:spPr/>
+        <p:txBody>
+          <a:bodyPr/>
+          <a:lstStyle/>
+          <a:p>
+            <a:r>
+              <a:rPr lang="en-DE" dirty="0"/>
+              <a:t>Einfach zu verstehen</a:t>
+            </a:r>
+          </a:p>
+          <a:p>
+            <a:r>
+              <a:rPr lang="en-DE" dirty="0"/>
+              <a:t>Klare Hierarchie</a:t>
+            </a:r>
+          </a:p>
+        </p:txBody>
+      </p:sp>
+      <p:sp>
+        <p:nvSpPr>
+          <p:cNvPr id="5" name="Text Placeholder 4">
+            <a:extLst>
+              <a:ext uri="{FF2B5EF4-FFF2-40B4-BE49-F238E27FC236}">
+                <a16:creationId xmlns:a16="http://schemas.microsoft.com/office/drawing/2014/main" id="{1EAC038E-1091-8392-14B0-AABFB33FE7C5}"/>
+              </a:ext>
+            </a:extLst>
+          </p:cNvPr>
+          <p:cNvSpPr>
+            <a:spLocks noGrp="1"/>
+          </p:cNvSpPr>
+          <p:nvPr>
+            <p:ph type="body" sz="quarter" idx="3"/>
+          </p:nvPr>
+        </p:nvSpPr>
+        <p:spPr/>
+        <p:txBody>
+          <a:bodyPr/>
+          <a:lstStyle/>
+          <a:p>
+            <a:r>
+              <a:rPr lang="en-DE" dirty="0"/>
+              <a:t>Cons</a:t>
+            </a:r>
+          </a:p>
+        </p:txBody>
+      </p:sp>
+      <p:sp>
+        <p:nvSpPr>
+          <p:cNvPr id="6" name="Content Placeholder 5">
+            <a:extLst>
+              <a:ext uri="{FF2B5EF4-FFF2-40B4-BE49-F238E27FC236}">
+                <a16:creationId xmlns:a16="http://schemas.microsoft.com/office/drawing/2014/main" id="{FAA583F1-D6A2-8943-6261-C88C90198F5D}"/>
+              </a:ext>
+            </a:extLst>
+          </p:cNvPr>
+          <p:cNvSpPr>
+            <a:spLocks noGrp="1"/>
+          </p:cNvSpPr>
+          <p:nvPr>
+            <p:ph sz="quarter" idx="4"/>
+          </p:nvPr>
+        </p:nvSpPr>
+        <p:spPr/>
+        <p:txBody>
+          <a:bodyPr/>
+          <a:lstStyle/>
+          <a:p>
+            <a:r>
+              <a:rPr lang="en-DE" dirty="0"/>
+              <a:t>Statisch und unflexibel</a:t>
+            </a:r>
+          </a:p>
+          <a:p>
+            <a:r>
+              <a:rPr lang="en-GB" dirty="0"/>
+              <a:t>Sehr </a:t>
+            </a:r>
+            <a:r>
+              <a:rPr lang="de-DE" noProof="0" dirty="0"/>
+              <a:t>aufwändig bei Änderungen</a:t>
+            </a:r>
+          </a:p>
+          <a:p>
+            <a:r>
+              <a:rPr lang="de-DE" dirty="0"/>
+              <a:t>Kann zu einer ”Gottklasse“ führen, die zu viel macht</a:t>
+            </a:r>
+            <a:endParaRPr lang="en-DE" dirty="0"/>
+          </a:p>
+        </p:txBody>
+      </p:sp>
+    </p:spTree>
+    <p:extLst>
+      <p:ext uri="{BB962C8B-B14F-4D97-AF65-F5344CB8AC3E}">
+        <p14:creationId xmlns:p14="http://schemas.microsoft.com/office/powerpoint/2010/main" val="1775952906"/>
+      </p:ext>
+    </p:extLst>
+  </p:cSld>
+  <p:clrMapOvr>
+    <a:masterClrMapping/>
+  </p:clrMapOvr>
+</p:sld>
+</file>
+
+<file path=ppt/slides/slide9.xml><?xml version="1.0" encoding="utf-8"?>
+<p:sld xmlns:a="http://schemas.openxmlformats.org/drawingml/2006/main" xmlns:r="http://schemas.openxmlformats.org/officeDocument/2006/relationships" xmlns:p="http://schemas.openxmlformats.org/presentationml/2006/main">
+  <p:cSld>
+    <p:spTree>
+      <p:nvGrpSpPr>
+        <p:cNvPr id="1" name="">
+          <a:extLst>
+            <a:ext uri="{FF2B5EF4-FFF2-40B4-BE49-F238E27FC236}">
+              <a16:creationId xmlns:a16="http://schemas.microsoft.com/office/drawing/2014/main" id="{2BB20110-488C-EB6F-DA10-5CD564DF5BE5}"/>
+            </a:ext>
+          </a:extLst>
+        </p:cNvPr>
+        <p:cNvGrpSpPr/>
+        <p:nvPr/>
+      </p:nvGrpSpPr>
+      <p:grpSpPr>
+        <a:xfrm>
+          <a:off x="0" y="0"/>
+          <a:ext cx="0" cy="0"/>
+          <a:chOff x="0" y="0"/>
+          <a:chExt cx="0" cy="0"/>
+        </a:xfrm>
+      </p:grpSpPr>
+      <p:sp>
+        <p:nvSpPr>
+          <p:cNvPr id="2" name="Title 1">
+            <a:extLst>
+              <a:ext uri="{FF2B5EF4-FFF2-40B4-BE49-F238E27FC236}">
+                <a16:creationId xmlns:a16="http://schemas.microsoft.com/office/drawing/2014/main" id="{315BF872-A503-C8DF-6906-DD79766CF919}"/>
+              </a:ext>
+            </a:extLst>
+          </p:cNvPr>
+          <p:cNvSpPr>
+            <a:spLocks noGrp="1"/>
+          </p:cNvSpPr>
+          <p:nvPr>
+            <p:ph type="title"/>
+          </p:nvPr>
+        </p:nvSpPr>
+        <p:spPr/>
+        <p:txBody>
+          <a:bodyPr/>
+          <a:lstStyle/>
+          <a:p>
+            <a:r>
+              <a:rPr lang="en-DE" dirty="0"/>
+              <a:t>Komposition</a:t>
+            </a:r>
+            <a:br>
+              <a:rPr lang="en-DE" dirty="0"/>
+            </a:br>
+            <a:r>
+              <a:rPr lang="en-DE" sz="3600" dirty="0"/>
+              <a:t>- der Baukasten</a:t>
+            </a:r>
+            <a:endParaRPr lang="en-DE" dirty="0"/>
+          </a:p>
+        </p:txBody>
+      </p:sp>
+      <p:sp>
+        <p:nvSpPr>
+          <p:cNvPr id="3" name="Text Placeholder 2">
+            <a:extLst>
+              <a:ext uri="{FF2B5EF4-FFF2-40B4-BE49-F238E27FC236}">
+                <a16:creationId xmlns:a16="http://schemas.microsoft.com/office/drawing/2014/main" id="{B3B20762-C42B-49BE-C630-9E111AE19438}"/>
+              </a:ext>
+            </a:extLst>
+          </p:cNvPr>
+          <p:cNvSpPr>
+            <a:spLocks noGrp="1"/>
+          </p:cNvSpPr>
+          <p:nvPr>
+            <p:ph type="body" idx="1"/>
+          </p:nvPr>
+        </p:nvSpPr>
+        <p:spPr/>
+        <p:txBody>
+          <a:bodyPr/>
+          <a:lstStyle/>
+          <a:p>
+            <a:r>
+              <a:rPr lang="en-DE" dirty="0"/>
+              <a:t>Pros</a:t>
+            </a:r>
+          </a:p>
+        </p:txBody>
+      </p:sp>
+      <p:sp>
+        <p:nvSpPr>
+          <p:cNvPr id="4" name="Content Placeholder 3">
+            <a:extLst>
+              <a:ext uri="{FF2B5EF4-FFF2-40B4-BE49-F238E27FC236}">
+                <a16:creationId xmlns:a16="http://schemas.microsoft.com/office/drawing/2014/main" id="{D3BE34C2-2F12-81C3-E341-091E8350DD30}"/>
+              </a:ext>
+            </a:extLst>
+          </p:cNvPr>
+          <p:cNvSpPr>
+            <a:spLocks noGrp="1"/>
+          </p:cNvSpPr>
+          <p:nvPr>
+            <p:ph sz="half" idx="2"/>
+          </p:nvPr>
+        </p:nvSpPr>
+        <p:spPr/>
+        <p:txBody>
+          <a:bodyPr/>
+          <a:lstStyle/>
+          <a:p>
+            <a:r>
+              <a:rPr lang="en-DE" dirty="0"/>
+              <a:t>Flexibel, leicht erweiterbar</a:t>
+            </a:r>
+          </a:p>
+          <a:p>
+            <a:r>
+              <a:rPr lang="en-GB" dirty="0"/>
+              <a:t>B</a:t>
+            </a:r>
+            <a:r>
+              <a:rPr lang="en-DE" dirty="0"/>
+              <a:t>essere Testbarkeit</a:t>
+            </a:r>
+          </a:p>
+          <a:p>
+            <a:r>
+              <a:rPr lang="en-DE" dirty="0"/>
+              <a:t>Stabiler</a:t>
+            </a:r>
+          </a:p>
+          <a:p>
+            <a:r>
+              <a:rPr lang="en-GB" dirty="0"/>
+              <a:t>K</a:t>
+            </a:r>
+            <a:r>
+              <a:rPr lang="en-DE" dirty="0"/>
+              <a:t>ann leichter wiederverwendet werden</a:t>
+            </a:r>
+          </a:p>
+        </p:txBody>
+      </p:sp>
+      <p:sp>
+        <p:nvSpPr>
+          <p:cNvPr id="5" name="Text Placeholder 4">
+            <a:extLst>
+              <a:ext uri="{FF2B5EF4-FFF2-40B4-BE49-F238E27FC236}">
+                <a16:creationId xmlns:a16="http://schemas.microsoft.com/office/drawing/2014/main" id="{16F983A6-3B17-0EBD-C980-91AEE969EED0}"/>
+              </a:ext>
+            </a:extLst>
+          </p:cNvPr>
+          <p:cNvSpPr>
+            <a:spLocks noGrp="1"/>
+          </p:cNvSpPr>
+          <p:nvPr>
+            <p:ph type="body" sz="quarter" idx="3"/>
+          </p:nvPr>
+        </p:nvSpPr>
+        <p:spPr/>
+        <p:txBody>
+          <a:bodyPr/>
+          <a:lstStyle/>
+          <a:p>
+            <a:r>
+              <a:rPr lang="en-DE" dirty="0"/>
+              <a:t>Cons</a:t>
+            </a:r>
+          </a:p>
+        </p:txBody>
+      </p:sp>
+      <p:sp>
+        <p:nvSpPr>
+          <p:cNvPr id="6" name="Content Placeholder 5">
+            <a:extLst>
+              <a:ext uri="{FF2B5EF4-FFF2-40B4-BE49-F238E27FC236}">
+                <a16:creationId xmlns:a16="http://schemas.microsoft.com/office/drawing/2014/main" id="{2CE7AD85-B6CC-EB1C-D53C-530177260DE2}"/>
+              </a:ext>
+            </a:extLst>
+          </p:cNvPr>
+          <p:cNvSpPr>
+            <a:spLocks noGrp="1"/>
+          </p:cNvSpPr>
+          <p:nvPr>
+            <p:ph sz="quarter" idx="4"/>
+          </p:nvPr>
+        </p:nvSpPr>
+        <p:spPr/>
+        <p:txBody>
+          <a:bodyPr/>
+          <a:lstStyle/>
+          <a:p>
+            <a:r>
+              <a:rPr lang="en-DE" dirty="0"/>
+              <a:t>Abstraktion kann komplexer sein</a:t>
+            </a:r>
+          </a:p>
+        </p:txBody>
+      </p:sp>
+    </p:spTree>
+    <p:extLst>
+      <p:ext uri="{BB962C8B-B14F-4D97-AF65-F5344CB8AC3E}">
+        <p14:creationId xmlns:p14="http://schemas.microsoft.com/office/powerpoint/2010/main" val="1839238302"/>
       </p:ext>
     </p:extLst>
   </p:cSld>

</xml_diff>